<commit_message>
finish: finish ops & TE code building (#1)
</commit_message>
<xml_diff>
--- a/Images/images.pptx
+++ b/Images/images.pptx
@@ -104,6 +104,11 @@
       </a:defRPr>
     </a:lvl9pPr>
   </p:defaultTextStyle>
+  <p:extLst>
+    <p:ext uri="{EFAFB233-063F-42B5-8137-9DF3F51BA10A}">
+      <p15:sldGuideLst xmlns:p15="http://schemas.microsoft.com/office/powerpoint/2012/main"/>
+    </p:ext>
+  </p:extLst>
 </p:presentation>
 </file>
 
@@ -256,7 +261,7 @@
           <a:p>
             <a:fld id="{F8066D3D-1DFE-A74D-8922-702084192356}" type="datetimeFigureOut">
               <a:rPr lang="en-CN" smtClean="0"/>
-              <a:t>2024/11/19</a:t>
+              <a:t>2024/11/21</a:t>
             </a:fld>
             <a:endParaRPr lang="en-CN"/>
           </a:p>
@@ -456,7 +461,7 @@
           <a:p>
             <a:fld id="{F8066D3D-1DFE-A74D-8922-702084192356}" type="datetimeFigureOut">
               <a:rPr lang="en-CN" smtClean="0"/>
-              <a:t>2024/11/19</a:t>
+              <a:t>2024/11/21</a:t>
             </a:fld>
             <a:endParaRPr lang="en-CN"/>
           </a:p>
@@ -666,7 +671,7 @@
           <a:p>
             <a:fld id="{F8066D3D-1DFE-A74D-8922-702084192356}" type="datetimeFigureOut">
               <a:rPr lang="en-CN" smtClean="0"/>
-              <a:t>2024/11/19</a:t>
+              <a:t>2024/11/21</a:t>
             </a:fld>
             <a:endParaRPr lang="en-CN"/>
           </a:p>
@@ -866,7 +871,7 @@
           <a:p>
             <a:fld id="{F8066D3D-1DFE-A74D-8922-702084192356}" type="datetimeFigureOut">
               <a:rPr lang="en-CN" smtClean="0"/>
-              <a:t>2024/11/19</a:t>
+              <a:t>2024/11/21</a:t>
             </a:fld>
             <a:endParaRPr lang="en-CN"/>
           </a:p>
@@ -1142,7 +1147,7 @@
           <a:p>
             <a:fld id="{F8066D3D-1DFE-A74D-8922-702084192356}" type="datetimeFigureOut">
               <a:rPr lang="en-CN" smtClean="0"/>
-              <a:t>2024/11/19</a:t>
+              <a:t>2024/11/21</a:t>
             </a:fld>
             <a:endParaRPr lang="en-CN"/>
           </a:p>
@@ -1410,7 +1415,7 @@
           <a:p>
             <a:fld id="{F8066D3D-1DFE-A74D-8922-702084192356}" type="datetimeFigureOut">
               <a:rPr lang="en-CN" smtClean="0"/>
-              <a:t>2024/11/19</a:t>
+              <a:t>2024/11/21</a:t>
             </a:fld>
             <a:endParaRPr lang="en-CN"/>
           </a:p>
@@ -1825,7 +1830,7 @@
           <a:p>
             <a:fld id="{F8066D3D-1DFE-A74D-8922-702084192356}" type="datetimeFigureOut">
               <a:rPr lang="en-CN" smtClean="0"/>
-              <a:t>2024/11/19</a:t>
+              <a:t>2024/11/21</a:t>
             </a:fld>
             <a:endParaRPr lang="en-CN"/>
           </a:p>
@@ -1967,7 +1972,7 @@
           <a:p>
             <a:fld id="{F8066D3D-1DFE-A74D-8922-702084192356}" type="datetimeFigureOut">
               <a:rPr lang="en-CN" smtClean="0"/>
-              <a:t>2024/11/19</a:t>
+              <a:t>2024/11/21</a:t>
             </a:fld>
             <a:endParaRPr lang="en-CN"/>
           </a:p>
@@ -2080,7 +2085,7 @@
           <a:p>
             <a:fld id="{F8066D3D-1DFE-A74D-8922-702084192356}" type="datetimeFigureOut">
               <a:rPr lang="en-CN" smtClean="0"/>
-              <a:t>2024/11/19</a:t>
+              <a:t>2024/11/21</a:t>
             </a:fld>
             <a:endParaRPr lang="en-CN"/>
           </a:p>
@@ -2393,7 +2398,7 @@
           <a:p>
             <a:fld id="{F8066D3D-1DFE-A74D-8922-702084192356}" type="datetimeFigureOut">
               <a:rPr lang="en-CN" smtClean="0"/>
-              <a:t>2024/11/19</a:t>
+              <a:t>2024/11/21</a:t>
             </a:fld>
             <a:endParaRPr lang="en-CN"/>
           </a:p>
@@ -2682,7 +2687,7 @@
           <a:p>
             <a:fld id="{F8066D3D-1DFE-A74D-8922-702084192356}" type="datetimeFigureOut">
               <a:rPr lang="en-CN" smtClean="0"/>
-              <a:t>2024/11/19</a:t>
+              <a:t>2024/11/21</a:t>
             </a:fld>
             <a:endParaRPr lang="en-CN"/>
           </a:p>
@@ -2925,7 +2930,7 @@
           <a:p>
             <a:fld id="{F8066D3D-1DFE-A74D-8922-702084192356}" type="datetimeFigureOut">
               <a:rPr lang="en-CN" smtClean="0"/>
-              <a:t>2024/11/19</a:t>
+              <a:t>2024/11/21</a:t>
             </a:fld>
             <a:endParaRPr lang="en-CN"/>
           </a:p>
@@ -3974,6 +3979,101 @@
           </p:txBody>
         </p:sp>
       </p:grpSp>
+      <p:sp>
+        <p:nvSpPr>
+          <p:cNvPr id="14" name="Rounded Rectangle 13">
+            <a:extLst>
+              <a:ext uri="{FF2B5EF4-FFF2-40B4-BE49-F238E27FC236}">
+                <a16:creationId xmlns:a16="http://schemas.microsoft.com/office/drawing/2014/main" id="{B9D3683B-4340-3A4C-A9F8-00506C33A736}"/>
+              </a:ext>
+            </a:extLst>
+          </p:cNvPr>
+          <p:cNvSpPr/>
+          <p:nvPr/>
+        </p:nvSpPr>
+        <p:spPr>
+          <a:xfrm>
+            <a:off x="236847" y="4944755"/>
+            <a:ext cx="11708238" cy="515007"/>
+          </a:xfrm>
+          <a:prstGeom prst="roundRect">
+            <a:avLst>
+              <a:gd name="adj" fmla="val 4386"/>
+            </a:avLst>
+          </a:prstGeom>
+          <a:solidFill>
+            <a:schemeClr val="accent3">
+              <a:lumMod val="20000"/>
+              <a:lumOff val="80000"/>
+            </a:schemeClr>
+          </a:solidFill>
+          <a:ln w="19050">
+            <a:solidFill>
+              <a:schemeClr val="tx1"/>
+            </a:solidFill>
+          </a:ln>
+          <a:effectLst>
+            <a:outerShdw blurRad="50800" dist="38100" dir="2700000" algn="tl" rotWithShape="0">
+              <a:prstClr val="black">
+                <a:alpha val="40000"/>
+              </a:prstClr>
+            </a:outerShdw>
+          </a:effectLst>
+        </p:spPr>
+        <p:style>
+          <a:lnRef idx="2">
+            <a:schemeClr val="accent1">
+              <a:shade val="50000"/>
+            </a:schemeClr>
+          </a:lnRef>
+          <a:fillRef idx="1">
+            <a:schemeClr val="accent1"/>
+          </a:fillRef>
+          <a:effectRef idx="0">
+            <a:schemeClr val="accent1"/>
+          </a:effectRef>
+          <a:fontRef idx="minor">
+            <a:schemeClr val="lt1"/>
+          </a:fontRef>
+        </p:style>
+        <p:txBody>
+          <a:bodyPr rtlCol="0" anchor="ctr"/>
+          <a:lstStyle/>
+          <a:p>
+            <a:pPr algn="ctr"/>
+            <a:r>
+              <a:rPr lang="en-CN" sz="2000" b="1" dirty="0">
+                <a:solidFill>
+                  <a:schemeClr val="tx1"/>
+                </a:solidFill>
+                <a:latin typeface="Times New Roman" panose="02020603050405020304" pitchFamily="18" charset="0"/>
+                <a:cs typeface="Times New Roman" panose="02020603050405020304" pitchFamily="18" charset="0"/>
+              </a:rPr>
+              <a:t>Part </a:t>
+            </a:r>
+            <a:r>
+              <a:rPr lang="en-US" altLang="zh-CN" sz="2000" b="1" dirty="0">
+                <a:solidFill>
+                  <a:schemeClr val="tx1"/>
+                </a:solidFill>
+                <a:latin typeface="Times New Roman" panose="02020603050405020304" pitchFamily="18" charset="0"/>
+                <a:cs typeface="Times New Roman" panose="02020603050405020304" pitchFamily="18" charset="0"/>
+              </a:rPr>
+              <a:t>0</a:t>
+            </a:r>
+            <a:r>
+              <a:rPr lang="en-CN" sz="2000" b="1" dirty="0">
+                <a:solidFill>
+                  <a:schemeClr val="tx1"/>
+                </a:solidFill>
+                <a:latin typeface="Times New Roman" panose="02020603050405020304" pitchFamily="18" charset="0"/>
+                <a:cs typeface="Times New Roman" panose="02020603050405020304" pitchFamily="18" charset="0"/>
+              </a:rPr>
+              <a:t>. Ops</a:t>
+            </a:r>
+          </a:p>
+        </p:txBody>
+      </p:sp>
     </p:spTree>
     <p:extLst>
       <p:ext uri="{BB962C8B-B14F-4D97-AF65-F5344CB8AC3E}">

</xml_diff>

<commit_message>
add: add the DeepLOB framework
</commit_message>
<xml_diff>
--- a/Images/images.pptx
+++ b/Images/images.pptx
@@ -262,7 +262,7 @@
           <a:p>
             <a:fld id="{F8066D3D-1DFE-A74D-8922-702084192356}" type="datetimeFigureOut">
               <a:rPr lang="en-CN" smtClean="0"/>
-              <a:t>2024/11/21</a:t>
+              <a:t>2024/11/22</a:t>
             </a:fld>
             <a:endParaRPr lang="en-CN"/>
           </a:p>
@@ -462,7 +462,7 @@
           <a:p>
             <a:fld id="{F8066D3D-1DFE-A74D-8922-702084192356}" type="datetimeFigureOut">
               <a:rPr lang="en-CN" smtClean="0"/>
-              <a:t>2024/11/21</a:t>
+              <a:t>2024/11/22</a:t>
             </a:fld>
             <a:endParaRPr lang="en-CN"/>
           </a:p>
@@ -672,7 +672,7 @@
           <a:p>
             <a:fld id="{F8066D3D-1DFE-A74D-8922-702084192356}" type="datetimeFigureOut">
               <a:rPr lang="en-CN" smtClean="0"/>
-              <a:t>2024/11/21</a:t>
+              <a:t>2024/11/22</a:t>
             </a:fld>
             <a:endParaRPr lang="en-CN"/>
           </a:p>
@@ -872,7 +872,7 @@
           <a:p>
             <a:fld id="{F8066D3D-1DFE-A74D-8922-702084192356}" type="datetimeFigureOut">
               <a:rPr lang="en-CN" smtClean="0"/>
-              <a:t>2024/11/21</a:t>
+              <a:t>2024/11/22</a:t>
             </a:fld>
             <a:endParaRPr lang="en-CN"/>
           </a:p>
@@ -1148,7 +1148,7 @@
           <a:p>
             <a:fld id="{F8066D3D-1DFE-A74D-8922-702084192356}" type="datetimeFigureOut">
               <a:rPr lang="en-CN" smtClean="0"/>
-              <a:t>2024/11/21</a:t>
+              <a:t>2024/11/22</a:t>
             </a:fld>
             <a:endParaRPr lang="en-CN"/>
           </a:p>
@@ -1416,7 +1416,7 @@
           <a:p>
             <a:fld id="{F8066D3D-1DFE-A74D-8922-702084192356}" type="datetimeFigureOut">
               <a:rPr lang="en-CN" smtClean="0"/>
-              <a:t>2024/11/21</a:t>
+              <a:t>2024/11/22</a:t>
             </a:fld>
             <a:endParaRPr lang="en-CN"/>
           </a:p>
@@ -1831,7 +1831,7 @@
           <a:p>
             <a:fld id="{F8066D3D-1DFE-A74D-8922-702084192356}" type="datetimeFigureOut">
               <a:rPr lang="en-CN" smtClean="0"/>
-              <a:t>2024/11/21</a:t>
+              <a:t>2024/11/22</a:t>
             </a:fld>
             <a:endParaRPr lang="en-CN"/>
           </a:p>
@@ -1973,7 +1973,7 @@
           <a:p>
             <a:fld id="{F8066D3D-1DFE-A74D-8922-702084192356}" type="datetimeFigureOut">
               <a:rPr lang="en-CN" smtClean="0"/>
-              <a:t>2024/11/21</a:t>
+              <a:t>2024/11/22</a:t>
             </a:fld>
             <a:endParaRPr lang="en-CN"/>
           </a:p>
@@ -2086,7 +2086,7 @@
           <a:p>
             <a:fld id="{F8066D3D-1DFE-A74D-8922-702084192356}" type="datetimeFigureOut">
               <a:rPr lang="en-CN" smtClean="0"/>
-              <a:t>2024/11/21</a:t>
+              <a:t>2024/11/22</a:t>
             </a:fld>
             <a:endParaRPr lang="en-CN"/>
           </a:p>
@@ -2399,7 +2399,7 @@
           <a:p>
             <a:fld id="{F8066D3D-1DFE-A74D-8922-702084192356}" type="datetimeFigureOut">
               <a:rPr lang="en-CN" smtClean="0"/>
-              <a:t>2024/11/21</a:t>
+              <a:t>2024/11/22</a:t>
             </a:fld>
             <a:endParaRPr lang="en-CN"/>
           </a:p>
@@ -2688,7 +2688,7 @@
           <a:p>
             <a:fld id="{F8066D3D-1DFE-A74D-8922-702084192356}" type="datetimeFigureOut">
               <a:rPr lang="en-CN" smtClean="0"/>
-              <a:t>2024/11/21</a:t>
+              <a:t>2024/11/22</a:t>
             </a:fld>
             <a:endParaRPr lang="en-CN"/>
           </a:p>
@@ -2931,7 +2931,7 @@
           <a:p>
             <a:fld id="{F8066D3D-1DFE-A74D-8922-702084192356}" type="datetimeFigureOut">
               <a:rPr lang="en-CN" smtClean="0"/>
-              <a:t>2024/11/21</a:t>
+              <a:t>2024/11/22</a:t>
             </a:fld>
             <a:endParaRPr lang="en-CN"/>
           </a:p>
@@ -6003,7 +6003,7 @@
         </p:nvSpPr>
         <p:spPr>
           <a:xfrm>
-            <a:off x="10169890" y="993337"/>
+            <a:off x="7429308" y="1899357"/>
             <a:ext cx="1306409" cy="369332"/>
           </a:xfrm>
           <a:prstGeom prst="rect">
@@ -6026,7 +6026,7 @@
                 <a:latin typeface="Times New Roman" panose="02020603050405020304" pitchFamily="18" charset="0"/>
                 <a:cs typeface="Times New Roman" panose="02020603050405020304" pitchFamily="18" charset="0"/>
               </a:rPr>
-              <a:t>2022.12.30</a:t>
+              <a:t>2022.08.29</a:t>
             </a:r>
           </a:p>
         </p:txBody>
@@ -9784,6 +9784,48 @@
                 <a:cs typeface="Times New Roman" panose="02020603050405020304" pitchFamily="18" charset="0"/>
               </a:rPr>
               <a:t>9 Groups Totally</a:t>
+            </a:r>
+          </a:p>
+        </p:txBody>
+      </p:sp>
+      <p:sp>
+        <p:nvSpPr>
+          <p:cNvPr id="26" name="TextBox 25">
+            <a:extLst>
+              <a:ext uri="{FF2B5EF4-FFF2-40B4-BE49-F238E27FC236}">
+                <a16:creationId xmlns:a16="http://schemas.microsoft.com/office/drawing/2014/main" id="{74E1E071-13EF-F142-A853-09C6751625D3}"/>
+              </a:ext>
+            </a:extLst>
+          </p:cNvPr>
+          <p:cNvSpPr txBox="1"/>
+          <p:nvPr/>
+        </p:nvSpPr>
+        <p:spPr>
+          <a:xfrm>
+            <a:off x="10169890" y="1022189"/>
+            <a:ext cx="1306409" cy="369332"/>
+          </a:xfrm>
+          <a:prstGeom prst="rect">
+            <a:avLst/>
+          </a:prstGeom>
+          <a:noFill/>
+        </p:spPr>
+        <p:txBody>
+          <a:bodyPr wrap="square" rtlCol="0" anchor="ctr">
+            <a:spAutoFit/>
+          </a:bodyPr>
+          <a:lstStyle/>
+          <a:p>
+            <a:pPr algn="ctr"/>
+            <a:r>
+              <a:rPr lang="en-CN" b="1" dirty="0">
+                <a:solidFill>
+                  <a:srgbClr val="C00000"/>
+                </a:solidFill>
+                <a:latin typeface="Times New Roman" panose="02020603050405020304" pitchFamily="18" charset="0"/>
+                <a:cs typeface="Times New Roman" panose="02020603050405020304" pitchFamily="18" charset="0"/>
+              </a:rPr>
+              <a:t>2022.12.30</a:t>
             </a:r>
           </a:p>
         </p:txBody>

</xml_diff>